<commit_message>
update links and titles
</commit_message>
<xml_diff>
--- a/books/deep-learning-design-patterns/Workshops/Novice/Deep Learning Design Patterns - Workshop - Chapter II.pptx
+++ b/books/deep-learning-design-patterns/Workshops/Novice/Deep Learning Design Patterns - Workshop - Chapter II.pptx
@@ -8784,29 +8784,29 @@
               <a:buNone/>
             </a:pPr>
             <a:r>
-              <a:rPr lang="en" sz="4800">
+              <a:rPr lang="en" sz="3600">
                 <a:solidFill>
                   <a:srgbClr val="3D85C6"/>
                 </a:solidFill>
               </a:rPr>
-              <a:t>Deep Learning by Design</a:t>
+              <a:t>Deep Learning Design Patterns</a:t>
             </a:r>
             <a:br>
-              <a:rPr lang="en" sz="4800">
+              <a:rPr lang="en" sz="3600">
                 <a:solidFill>
                   <a:srgbClr val="3D85C6"/>
                 </a:solidFill>
               </a:rPr>
             </a:br>
             <a:r>
-              <a:rPr lang="en" sz="4800">
+              <a:rPr lang="en" sz="3600">
                 <a:solidFill>
                   <a:srgbClr val="3D85C6"/>
                 </a:solidFill>
               </a:rPr>
-              <a:t>Using Tensorflow 2.0</a:t>
-            </a:r>
-            <a:endParaRPr sz="4800">
+              <a:t>with Tensorflow 2.0</a:t>
+            </a:r>
+            <a:endParaRPr sz="3600">
               <a:solidFill>
                 <a:srgbClr val="3D85C6"/>
               </a:solidFill>
@@ -12353,7 +12353,7 @@
             <a:tbl>
               <a:tblPr>
                 <a:noFill/>
-                <a:tableStyleId>{988620D0-7669-41F4-938F-0C0862509A25}</a:tableStyleId>
+                <a:tableStyleId>{C261AB1C-F348-4948-A67A-8BC6FC254A98}</a:tableStyleId>
               </a:tblPr>
               <a:tblGrid>
                 <a:gridCol w="8104550"/>
@@ -13656,7 +13656,7 @@
             <a:tbl>
               <a:tblPr>
                 <a:noFill/>
-                <a:tableStyleId>{988620D0-7669-41F4-938F-0C0862509A25}</a:tableStyleId>
+                <a:tableStyleId>{C261AB1C-F348-4948-A67A-8BC6FC254A98}</a:tableStyleId>
               </a:tblPr>
               <a:tblGrid>
                 <a:gridCol w="8104550"/>
@@ -14555,7 +14555,7 @@
             <a:tbl>
               <a:tblPr>
                 <a:noFill/>
-                <a:tableStyleId>{988620D0-7669-41F4-938F-0C0862509A25}</a:tableStyleId>
+                <a:tableStyleId>{C261AB1C-F348-4948-A67A-8BC6FC254A98}</a:tableStyleId>
               </a:tblPr>
               <a:tblGrid>
                 <a:gridCol w="8104550"/>
@@ -15610,7 +15610,7 @@
             <a:tbl>
               <a:tblPr>
                 <a:noFill/>
-                <a:tableStyleId>{988620D0-7669-41F4-938F-0C0862509A25}</a:tableStyleId>
+                <a:tableStyleId>{C261AB1C-F348-4948-A67A-8BC6FC254A98}</a:tableStyleId>
               </a:tblPr>
               <a:tblGrid>
                 <a:gridCol w="8104550"/>
@@ -18981,7 +18981,7 @@
             <a:tbl>
               <a:tblPr>
                 <a:noFill/>
-                <a:tableStyleId>{988620D0-7669-41F4-938F-0C0862509A25}</a:tableStyleId>
+                <a:tableStyleId>{C261AB1C-F348-4948-A67A-8BC6FC254A98}</a:tableStyleId>
               </a:tblPr>
               <a:tblGrid>
                 <a:gridCol w="8104550"/>
@@ -22605,7 +22605,7 @@
             <a:tbl>
               <a:tblPr>
                 <a:noFill/>
-                <a:tableStyleId>{988620D0-7669-41F4-938F-0C0862509A25}</a:tableStyleId>
+                <a:tableStyleId>{C261AB1C-F348-4948-A67A-8BC6FC254A98}</a:tableStyleId>
               </a:tblPr>
               <a:tblGrid>
                 <a:gridCol w="8104550"/>
@@ -26245,7 +26245,7 @@
             <a:tbl>
               <a:tblPr>
                 <a:noFill/>
-                <a:tableStyleId>{988620D0-7669-41F4-938F-0C0862509A25}</a:tableStyleId>
+                <a:tableStyleId>{C261AB1C-F348-4948-A67A-8BC6FC254A98}</a:tableStyleId>
               </a:tblPr>
               <a:tblGrid>
                 <a:gridCol w="8104550"/>
@@ -30061,7 +30061,7 @@
             <a:tbl>
               <a:tblPr>
                 <a:noFill/>
-                <a:tableStyleId>{988620D0-7669-41F4-938F-0C0862509A25}</a:tableStyleId>
+                <a:tableStyleId>{C261AB1C-F348-4948-A67A-8BC6FC254A98}</a:tableStyleId>
               </a:tblPr>
               <a:tblGrid>
                 <a:gridCol w="8104550"/>
@@ -31682,7 +31682,7 @@
             <a:tbl>
               <a:tblPr>
                 <a:noFill/>
-                <a:tableStyleId>{988620D0-7669-41F4-938F-0C0862509A25}</a:tableStyleId>
+                <a:tableStyleId>{C261AB1C-F348-4948-A67A-8BC6FC254A98}</a:tableStyleId>
               </a:tblPr>
               <a:tblGrid>
                 <a:gridCol w="8104550"/>
@@ -32509,7 +32509,7 @@
             <a:tbl>
               <a:tblPr>
                 <a:noFill/>
-                <a:tableStyleId>{988620D0-7669-41F4-938F-0C0862509A25}</a:tableStyleId>
+                <a:tableStyleId>{C261AB1C-F348-4948-A67A-8BC6FC254A98}</a:tableStyleId>
               </a:tblPr>
               <a:tblGrid>
                 <a:gridCol w="8104550"/>
@@ -34473,7 +34473,7 @@
                           <a:cs typeface="Consolas"/>
                           <a:sym typeface="Consolas"/>
                         </a:rPr>
-                        <a:t>  activation</a:t>
+                        <a:t> activation</a:t>
                       </a:r>
                       <a:r>
                         <a:rPr lang="en" sz="1000">
@@ -35449,7 +35449,7 @@
             <a:tbl>
               <a:tblPr>
                 <a:noFill/>
-                <a:tableStyleId>{988620D0-7669-41F4-938F-0C0862509A25}</a:tableStyleId>
+                <a:tableStyleId>{C261AB1C-F348-4948-A67A-8BC6FC254A98}</a:tableStyleId>
               </a:tblPr>
               <a:tblGrid>
                 <a:gridCol w="8104550"/>
@@ -37339,7 +37339,7 @@
             <a:tbl>
               <a:tblPr>
                 <a:noFill/>
-                <a:tableStyleId>{988620D0-7669-41F4-938F-0C0862509A25}</a:tableStyleId>
+                <a:tableStyleId>{C261AB1C-F348-4948-A67A-8BC6FC254A98}</a:tableStyleId>
               </a:tblPr>
               <a:tblGrid>
                 <a:gridCol w="8104550"/>
@@ -39799,7 +39799,7 @@
             <a:tbl>
               <a:tblPr>
                 <a:noFill/>
-                <a:tableStyleId>{988620D0-7669-41F4-938F-0C0862509A25}</a:tableStyleId>
+                <a:tableStyleId>{C261AB1C-F348-4948-A67A-8BC6FC254A98}</a:tableStyleId>
               </a:tblPr>
               <a:tblGrid>
                 <a:gridCol w="8104550"/>
@@ -41588,7 +41588,7 @@
                 </a:highlight>
                 <a:hlinkClick r:id="rId4"/>
               </a:rPr>
-              <a:t>Deep Learning by Design - Workshop - Chapter 2.ipynb</a:t>
+              <a:t>Deep Learning Design Patterns - Workshop - Chapter II.ipynb</a:t>
             </a:r>
             <a:endParaRPr b="1" sz="1200">
               <a:solidFill>

</xml_diff>